<commit_message>
feat: finnish up with project middle semester report
</commit_message>
<xml_diff>
--- a/individualProject/audioProjectDsp_EEF.pptx
+++ b/individualProject/audioProjectDsp_EEF.pptx
@@ -14,13 +14,13 @@
   </p:handoutMasterIdLst>
   <p:sldIdLst>
     <p:sldId id="256" r:id="rId7"/>
-    <p:sldId id="283" r:id="rId8"/>
-    <p:sldId id="281" r:id="rId9"/>
-    <p:sldId id="299" r:id="rId10"/>
-    <p:sldId id="298" r:id="rId11"/>
-    <p:sldId id="287" r:id="rId12"/>
-    <p:sldId id="285" r:id="rId13"/>
-    <p:sldId id="296" r:id="rId14"/>
+    <p:sldId id="281" r:id="rId8"/>
+    <p:sldId id="298" r:id="rId9"/>
+    <p:sldId id="287" r:id="rId10"/>
+    <p:sldId id="299" r:id="rId11"/>
+    <p:sldId id="285" r:id="rId12"/>
+    <p:sldId id="296" r:id="rId13"/>
+    <p:sldId id="300" r:id="rId14"/>
     <p:sldId id="297" r:id="rId15"/>
   </p:sldIdLst>
   <p:sldSz cx="12192000" cy="6858000"/>
@@ -4277,7 +4277,7 @@
           <a:p>
             <a:fld id="{72F77756-703A-4C45-96D0-2261A4FADC57}" type="datetimeFigureOut">
               <a:rPr lang="en-US" smtClean="0"/>
-              <a:t>11/11/2023</a:t>
+              <a:t>11/13/2023</a:t>
             </a:fld>
             <a:endParaRPr lang="en-US"/>
           </a:p>
@@ -4455,7 +4455,7 @@
           <a:p>
             <a:fld id="{7E4A7845-6E42-A54B-BDCA-C3518250E7BF}" type="datetimeFigureOut">
               <a:rPr lang="en-US" smtClean="0"/>
-              <a:t>11/11/2023</a:t>
+              <a:t>11/13/2023</a:t>
             </a:fld>
             <a:endParaRPr lang="en-US"/>
           </a:p>
@@ -23318,105 +23318,6 @@
           <p:cNvPr id="2" name="Text Placeholder 1">
             <a:extLst>
               <a:ext uri="{FF2B5EF4-FFF2-40B4-BE49-F238E27FC236}">
-                <a16:creationId xmlns:a16="http://schemas.microsoft.com/office/drawing/2014/main" id="{A05F7608-D836-9C3F-CB46-EF4B9E14CFC2}"/>
-              </a:ext>
-            </a:extLst>
-          </p:cNvPr>
-          <p:cNvSpPr>
-            <a:spLocks noGrp="1"/>
-          </p:cNvSpPr>
-          <p:nvPr>
-            <p:ph type="body" sz="quarter" idx="11"/>
-          </p:nvPr>
-        </p:nvSpPr>
-        <p:spPr/>
-        <p:txBody>
-          <a:bodyPr/>
-          <a:lstStyle/>
-          <a:p>
-            <a:r>
-              <a:rPr lang="lt-LT" dirty="0"/>
-              <a:t>Įvadas</a:t>
-            </a:r>
-          </a:p>
-          <a:p>
-            <a:endParaRPr lang="lt-LT" dirty="0"/>
-          </a:p>
-        </p:txBody>
-      </p:sp>
-      <p:sp>
-        <p:nvSpPr>
-          <p:cNvPr id="4" name="Text Placeholder 3">
-            <a:extLst>
-              <a:ext uri="{FF2B5EF4-FFF2-40B4-BE49-F238E27FC236}">
-                <a16:creationId xmlns:a16="http://schemas.microsoft.com/office/drawing/2014/main" id="{57806F5C-5881-8ED6-A73F-DCEC115061BE}"/>
-              </a:ext>
-            </a:extLst>
-          </p:cNvPr>
-          <p:cNvSpPr>
-            <a:spLocks noGrp="1"/>
-          </p:cNvSpPr>
-          <p:nvPr>
-            <p:ph type="body" sz="quarter" idx="12"/>
-          </p:nvPr>
-        </p:nvSpPr>
-        <p:spPr>
-          <a:xfrm>
-            <a:off x="641645" y="1841326"/>
-            <a:ext cx="9830290" cy="3298234"/>
-          </a:xfrm>
-        </p:spPr>
-        <p:txBody>
-          <a:bodyPr/>
-          <a:lstStyle/>
-          <a:p>
-            <a:pPr marL="342900" indent="-342900">
-              <a:buFont typeface="Arial" panose="020B0604020202020204" pitchFamily="34" charset="0"/>
-              <a:buChar char="•"/>
-            </a:pPr>
-            <a:r>
-              <a:rPr lang="lt-LT" b="0"/>
-              <a:t>Mano tema -</a:t>
-            </a:r>
-            <a:endParaRPr lang="lt-LT" b="0" dirty="0"/>
-          </a:p>
-        </p:txBody>
-      </p:sp>
-    </p:spTree>
-    <p:extLst>
-      <p:ext uri="{BB962C8B-B14F-4D97-AF65-F5344CB8AC3E}">
-        <p14:creationId xmlns:p14="http://schemas.microsoft.com/office/powerpoint/2010/main" val="3527631501"/>
-      </p:ext>
-    </p:extLst>
-  </p:cSld>
-  <p:clrMapOvr>
-    <a:masterClrMapping/>
-  </p:clrMapOvr>
-</p:sld>
-</file>
-
-<file path=ppt/slides/slide3.xml><?xml version="1.0" encoding="utf-8"?>
-<p:sld xmlns:a="http://schemas.openxmlformats.org/drawingml/2006/main" xmlns:r="http://schemas.openxmlformats.org/officeDocument/2006/relationships" xmlns:p="http://schemas.openxmlformats.org/presentationml/2006/main">
-  <p:cSld>
-    <p:spTree>
-      <p:nvGrpSpPr>
-        <p:cNvPr id="1" name=""/>
-        <p:cNvGrpSpPr/>
-        <p:nvPr/>
-      </p:nvGrpSpPr>
-      <p:grpSpPr>
-        <a:xfrm>
-          <a:off x="0" y="0"/>
-          <a:ext cx="0" cy="0"/>
-          <a:chOff x="0" y="0"/>
-          <a:chExt cx="0" cy="0"/>
-        </a:xfrm>
-      </p:grpSpPr>
-      <p:sp>
-        <p:nvSpPr>
-          <p:cNvPr id="2" name="Text Placeholder 1">
-            <a:extLst>
-              <a:ext uri="{FF2B5EF4-FFF2-40B4-BE49-F238E27FC236}">
                 <a16:creationId xmlns:a16="http://schemas.microsoft.com/office/drawing/2014/main" id="{6B84DCE6-E262-1230-7871-6B4883A5CEF6}"/>
               </a:ext>
             </a:extLst>
@@ -23435,7 +23336,7 @@
           <a:p>
             <a:r>
               <a:rPr lang="lt-LT" dirty="0"/>
-              <a:t>Miego apnėja</a:t>
+              <a:t>Miego apnėjos aptikimas</a:t>
             </a:r>
           </a:p>
         </p:txBody>
@@ -23458,41 +23359,17 @@
         </p:nvSpPr>
         <p:spPr>
           <a:xfrm>
-            <a:off x="132430" y="1753643"/>
-            <a:ext cx="6236839" cy="3040299"/>
+            <a:off x="8261019" y="1124661"/>
+            <a:ext cx="3314700" cy="1618539"/>
           </a:xfrm>
         </p:spPr>
         <p:txBody>
           <a:bodyPr/>
           <a:lstStyle/>
           <a:p>
-            <a:pPr marL="342900" indent="-342900">
-              <a:buFont typeface="Arial" panose="020B0604020202020204" pitchFamily="34" charset="0"/>
-              <a:buChar char="•"/>
-            </a:pPr>
-            <a:r>
-              <a:rPr lang="lt-LT" sz="2800" dirty="0"/>
-              <a:t>Žemės stebėjimas</a:t>
-            </a:r>
-          </a:p>
-          <a:p>
-            <a:pPr marL="342900" indent="-342900">
-              <a:buFont typeface="Arial" panose="020B0604020202020204" pitchFamily="34" charset="0"/>
-              <a:buChar char="•"/>
-            </a:pPr>
-            <a:r>
-              <a:rPr lang="lt-LT" sz="2800" dirty="0"/>
-              <a:t>Duomenų perdavimas</a:t>
-            </a:r>
-          </a:p>
-          <a:p>
-            <a:pPr marL="342900" indent="-342900">
-              <a:buFont typeface="Arial" panose="020B0604020202020204" pitchFamily="34" charset="0"/>
-              <a:buChar char="•"/>
-            </a:pPr>
-            <a:r>
-              <a:rPr lang="lt-LT" sz="2800" dirty="0"/>
-              <a:t>Naujų technologijų testavimas /  mokslinio pobūdžio</a:t>
+            <a:r>
+              <a:rPr lang="lt-LT" sz="3000" dirty="0"/>
+              <a:t>Polisomnografija </a:t>
             </a:r>
           </a:p>
           <a:p>
@@ -23545,10 +23422,414 @@
           </a:p>
         </p:txBody>
       </p:sp>
+      <p:pic>
+        <p:nvPicPr>
+          <p:cNvPr id="3" name="Picture 2" descr="A picture containing screenshot&#10;&#10;Description automatically generated">
+            <a:extLst>
+              <a:ext uri="{FF2B5EF4-FFF2-40B4-BE49-F238E27FC236}">
+                <a16:creationId xmlns:a16="http://schemas.microsoft.com/office/drawing/2014/main" id="{2B5EE783-3FBB-6C39-A3C4-CB2360B15F60}"/>
+              </a:ext>
+            </a:extLst>
+          </p:cNvPr>
+          <p:cNvPicPr>
+            <a:picLocks noChangeAspect="1"/>
+          </p:cNvPicPr>
+          <p:nvPr/>
+        </p:nvPicPr>
+        <p:blipFill>
+          <a:blip r:embed="rId2"/>
+          <a:stretch>
+            <a:fillRect/>
+          </a:stretch>
+        </p:blipFill>
+        <p:spPr>
+          <a:xfrm>
+            <a:off x="410154" y="3042746"/>
+            <a:ext cx="6479257" cy="3515706"/>
+          </a:xfrm>
+          <a:prstGeom prst="rect">
+            <a:avLst/>
+          </a:prstGeom>
+        </p:spPr>
+      </p:pic>
+      <p:pic>
+        <p:nvPicPr>
+          <p:cNvPr id="5" name="Picture 4">
+            <a:extLst>
+              <a:ext uri="{FF2B5EF4-FFF2-40B4-BE49-F238E27FC236}">
+                <a16:creationId xmlns:a16="http://schemas.microsoft.com/office/drawing/2014/main" id="{BC6B1D3D-C5A8-B927-575D-C01AB490F95D}"/>
+              </a:ext>
+            </a:extLst>
+          </p:cNvPr>
+          <p:cNvPicPr>
+            <a:picLocks noChangeAspect="1"/>
+          </p:cNvPicPr>
+          <p:nvPr/>
+        </p:nvPicPr>
+        <p:blipFill>
+          <a:blip r:embed="rId3">
+            <a:extLst>
+              <a:ext uri="{28A0092B-C50C-407E-A947-70E740481C1C}">
+                <a14:useLocalDpi xmlns:a14="http://schemas.microsoft.com/office/drawing/2010/main" val="0"/>
+              </a:ext>
+            </a:extLst>
+          </a:blip>
+          <a:srcRect/>
+          <a:stretch>
+            <a:fillRect/>
+          </a:stretch>
+        </p:blipFill>
+        <p:spPr bwMode="auto">
+          <a:xfrm>
+            <a:off x="8544878" y="2743199"/>
+            <a:ext cx="2248964" cy="4114801"/>
+          </a:xfrm>
+          <a:prstGeom prst="rect">
+            <a:avLst/>
+          </a:prstGeom>
+          <a:noFill/>
+          <a:ln>
+            <a:noFill/>
+          </a:ln>
+        </p:spPr>
+      </p:pic>
+      <p:sp>
+        <p:nvSpPr>
+          <p:cNvPr id="6" name="Text Placeholder 3">
+            <a:extLst>
+              <a:ext uri="{FF2B5EF4-FFF2-40B4-BE49-F238E27FC236}">
+                <a16:creationId xmlns:a16="http://schemas.microsoft.com/office/drawing/2014/main" id="{8D9A4B0F-A4D2-8D06-8347-60CF12B8FCE6}"/>
+              </a:ext>
+            </a:extLst>
+          </p:cNvPr>
+          <p:cNvSpPr txBox="1">
+            <a:spLocks/>
+          </p:cNvSpPr>
+          <p:nvPr/>
+        </p:nvSpPr>
+        <p:spPr>
+          <a:xfrm>
+            <a:off x="616281" y="1130352"/>
+            <a:ext cx="3314700" cy="1618539"/>
+          </a:xfrm>
+          <a:prstGeom prst="rect">
+            <a:avLst/>
+          </a:prstGeom>
+        </p:spPr>
+        <p:txBody>
+          <a:bodyPr anchor="b"/>
+          <a:lstStyle>
+            <a:lvl1pPr marL="0" indent="0" algn="l" defTabSz="914400" rtl="0" eaLnBrk="1" latinLnBrk="0" hangingPunct="1">
+              <a:lnSpc>
+                <a:spcPct val="110000"/>
+              </a:lnSpc>
+              <a:spcBef>
+                <a:spcPts val="0"/>
+              </a:spcBef>
+              <a:spcAft>
+                <a:spcPts val="0"/>
+              </a:spcAft>
+              <a:buFont typeface="+mj-lt"/>
+              <a:buNone/>
+              <a:defRPr sz="2200" b="1" i="0" kern="1200">
+                <a:solidFill>
+                  <a:schemeClr val="bg1"/>
+                </a:solidFill>
+                <a:latin typeface="Arial" panose="020B0604020202020204" pitchFamily="34" charset="0"/>
+                <a:ea typeface="Inter Medium" panose="020B0502030000000004" pitchFamily="34" charset="0"/>
+                <a:cs typeface="Arial" panose="020B0604020202020204" pitchFamily="34" charset="0"/>
+              </a:defRPr>
+            </a:lvl1pPr>
+            <a:lvl2pPr marL="685800" indent="-228600" algn="l" defTabSz="914400" rtl="0" eaLnBrk="1" latinLnBrk="0" hangingPunct="1">
+              <a:lnSpc>
+                <a:spcPct val="90000"/>
+              </a:lnSpc>
+              <a:spcBef>
+                <a:spcPts val="500"/>
+              </a:spcBef>
+              <a:buFont typeface="Arial" panose="020B0604020202020204" pitchFamily="34" charset="0"/>
+              <a:buChar char="•"/>
+              <a:defRPr sz="2400" kern="1200">
+                <a:solidFill>
+                  <a:schemeClr val="tx1"/>
+                </a:solidFill>
+                <a:latin typeface="+mn-lt"/>
+                <a:ea typeface="+mn-ea"/>
+                <a:cs typeface="+mn-cs"/>
+              </a:defRPr>
+            </a:lvl2pPr>
+            <a:lvl3pPr marL="1143000" indent="-228600" algn="l" defTabSz="914400" rtl="0" eaLnBrk="1" latinLnBrk="0" hangingPunct="1">
+              <a:lnSpc>
+                <a:spcPct val="90000"/>
+              </a:lnSpc>
+              <a:spcBef>
+                <a:spcPts val="500"/>
+              </a:spcBef>
+              <a:buFont typeface="Arial" panose="020B0604020202020204" pitchFamily="34" charset="0"/>
+              <a:buChar char="•"/>
+              <a:defRPr sz="2000" kern="1200">
+                <a:solidFill>
+                  <a:schemeClr val="tx1"/>
+                </a:solidFill>
+                <a:latin typeface="+mn-lt"/>
+                <a:ea typeface="+mn-ea"/>
+                <a:cs typeface="+mn-cs"/>
+              </a:defRPr>
+            </a:lvl3pPr>
+            <a:lvl4pPr marL="1600200" indent="-228600" algn="l" defTabSz="914400" rtl="0" eaLnBrk="1" latinLnBrk="0" hangingPunct="1">
+              <a:lnSpc>
+                <a:spcPct val="90000"/>
+              </a:lnSpc>
+              <a:spcBef>
+                <a:spcPts val="500"/>
+              </a:spcBef>
+              <a:buFont typeface="Arial" panose="020B0604020202020204" pitchFamily="34" charset="0"/>
+              <a:buChar char="•"/>
+              <a:defRPr sz="1800" kern="1200">
+                <a:solidFill>
+                  <a:schemeClr val="tx1"/>
+                </a:solidFill>
+                <a:latin typeface="+mn-lt"/>
+                <a:ea typeface="+mn-ea"/>
+                <a:cs typeface="+mn-cs"/>
+              </a:defRPr>
+            </a:lvl4pPr>
+            <a:lvl5pPr marL="2057400" indent="-228600" algn="l" defTabSz="914400" rtl="0" eaLnBrk="1" latinLnBrk="0" hangingPunct="1">
+              <a:lnSpc>
+                <a:spcPct val="90000"/>
+              </a:lnSpc>
+              <a:spcBef>
+                <a:spcPts val="500"/>
+              </a:spcBef>
+              <a:buFont typeface="Arial" panose="020B0604020202020204" pitchFamily="34" charset="0"/>
+              <a:buChar char="•"/>
+              <a:defRPr sz="1800" kern="1200">
+                <a:solidFill>
+                  <a:schemeClr val="tx1"/>
+                </a:solidFill>
+                <a:latin typeface="+mn-lt"/>
+                <a:ea typeface="+mn-ea"/>
+                <a:cs typeface="+mn-cs"/>
+              </a:defRPr>
+            </a:lvl5pPr>
+            <a:lvl6pPr marL="2514600" indent="-228600" algn="l" defTabSz="914400" rtl="0" eaLnBrk="1" latinLnBrk="0" hangingPunct="1">
+              <a:lnSpc>
+                <a:spcPct val="90000"/>
+              </a:lnSpc>
+              <a:spcBef>
+                <a:spcPts val="500"/>
+              </a:spcBef>
+              <a:buFont typeface="Arial" panose="020B0604020202020204" pitchFamily="34" charset="0"/>
+              <a:buChar char="•"/>
+              <a:defRPr sz="1800" kern="1200">
+                <a:solidFill>
+                  <a:schemeClr val="tx1"/>
+                </a:solidFill>
+                <a:latin typeface="+mn-lt"/>
+                <a:ea typeface="+mn-ea"/>
+                <a:cs typeface="+mn-cs"/>
+              </a:defRPr>
+            </a:lvl6pPr>
+            <a:lvl7pPr marL="2971800" indent="-228600" algn="l" defTabSz="914400" rtl="0" eaLnBrk="1" latinLnBrk="0" hangingPunct="1">
+              <a:lnSpc>
+                <a:spcPct val="90000"/>
+              </a:lnSpc>
+              <a:spcBef>
+                <a:spcPts val="500"/>
+              </a:spcBef>
+              <a:buFont typeface="Arial" panose="020B0604020202020204" pitchFamily="34" charset="0"/>
+              <a:buChar char="•"/>
+              <a:defRPr sz="1800" kern="1200">
+                <a:solidFill>
+                  <a:schemeClr val="tx1"/>
+                </a:solidFill>
+                <a:latin typeface="+mn-lt"/>
+                <a:ea typeface="+mn-ea"/>
+                <a:cs typeface="+mn-cs"/>
+              </a:defRPr>
+            </a:lvl7pPr>
+            <a:lvl8pPr marL="3429000" indent="-228600" algn="l" defTabSz="914400" rtl="0" eaLnBrk="1" latinLnBrk="0" hangingPunct="1">
+              <a:lnSpc>
+                <a:spcPct val="90000"/>
+              </a:lnSpc>
+              <a:spcBef>
+                <a:spcPts val="500"/>
+              </a:spcBef>
+              <a:buFont typeface="Arial" panose="020B0604020202020204" pitchFamily="34" charset="0"/>
+              <a:buChar char="•"/>
+              <a:defRPr sz="1800" kern="1200">
+                <a:solidFill>
+                  <a:schemeClr val="tx1"/>
+                </a:solidFill>
+                <a:latin typeface="+mn-lt"/>
+                <a:ea typeface="+mn-ea"/>
+                <a:cs typeface="+mn-cs"/>
+              </a:defRPr>
+            </a:lvl8pPr>
+            <a:lvl9pPr marL="3886200" indent="-228600" algn="l" defTabSz="914400" rtl="0" eaLnBrk="1" latinLnBrk="0" hangingPunct="1">
+              <a:lnSpc>
+                <a:spcPct val="90000"/>
+              </a:lnSpc>
+              <a:spcBef>
+                <a:spcPts val="500"/>
+              </a:spcBef>
+              <a:buFont typeface="Arial" panose="020B0604020202020204" pitchFamily="34" charset="0"/>
+              <a:buChar char="•"/>
+              <a:defRPr sz="1800" kern="1200">
+                <a:solidFill>
+                  <a:schemeClr val="tx1"/>
+                </a:solidFill>
+                <a:latin typeface="+mn-lt"/>
+                <a:ea typeface="+mn-ea"/>
+                <a:cs typeface="+mn-cs"/>
+              </a:defRPr>
+            </a:lvl9pPr>
+          </a:lstStyle>
+          <a:p>
+            <a:r>
+              <a:rPr lang="lt-LT" sz="3000" dirty="0"/>
+              <a:t>Problema</a:t>
+            </a:r>
+          </a:p>
+          <a:p>
+            <a:pPr marL="342900" indent="-342900">
+              <a:buFont typeface="Arial" panose="020B0604020202020204" pitchFamily="34" charset="0"/>
+              <a:buChar char="•"/>
+            </a:pPr>
+            <a:endParaRPr lang="lt-LT" dirty="0"/>
+          </a:p>
+        </p:txBody>
+      </p:sp>
     </p:spTree>
     <p:extLst>
       <p:ext uri="{BB962C8B-B14F-4D97-AF65-F5344CB8AC3E}">
         <p14:creationId xmlns:p14="http://schemas.microsoft.com/office/powerpoint/2010/main" val="808855670"/>
+      </p:ext>
+    </p:extLst>
+  </p:cSld>
+  <p:clrMapOvr>
+    <a:masterClrMapping/>
+  </p:clrMapOvr>
+</p:sld>
+</file>
+
+<file path=ppt/slides/slide3.xml><?xml version="1.0" encoding="utf-8"?>
+<p:sld xmlns:a="http://schemas.openxmlformats.org/drawingml/2006/main" xmlns:r="http://schemas.openxmlformats.org/officeDocument/2006/relationships" xmlns:p="http://schemas.openxmlformats.org/presentationml/2006/main">
+  <p:cSld>
+    <p:spTree>
+      <p:nvGrpSpPr>
+        <p:cNvPr id="1" name=""/>
+        <p:cNvGrpSpPr/>
+        <p:nvPr/>
+      </p:nvGrpSpPr>
+      <p:grpSpPr>
+        <a:xfrm>
+          <a:off x="0" y="0"/>
+          <a:ext cx="0" cy="0"/>
+          <a:chOff x="0" y="0"/>
+          <a:chExt cx="0" cy="0"/>
+        </a:xfrm>
+      </p:grpSpPr>
+      <p:sp>
+        <p:nvSpPr>
+          <p:cNvPr id="2" name="Text Placeholder 1">
+            <a:extLst>
+              <a:ext uri="{FF2B5EF4-FFF2-40B4-BE49-F238E27FC236}">
+                <a16:creationId xmlns:a16="http://schemas.microsoft.com/office/drawing/2014/main" id="{41233870-7BC0-7362-1E76-46246CEADCD4}"/>
+              </a:ext>
+            </a:extLst>
+          </p:cNvPr>
+          <p:cNvSpPr>
+            <a:spLocks noGrp="1"/>
+          </p:cNvSpPr>
+          <p:nvPr>
+            <p:ph type="body" sz="quarter" idx="11"/>
+          </p:nvPr>
+        </p:nvSpPr>
+        <p:spPr/>
+        <p:txBody>
+          <a:bodyPr/>
+          <a:lstStyle/>
+          <a:p>
+            <a:r>
+              <a:rPr lang="lt-LT" dirty="0"/>
+              <a:t>Darbo uždaviniai ir tikslas</a:t>
+            </a:r>
+            <a:endParaRPr lang="en-GB" b="1" dirty="0"/>
+          </a:p>
+        </p:txBody>
+      </p:sp>
+      <p:sp>
+        <p:nvSpPr>
+          <p:cNvPr id="4" name="Text Placeholder 3">
+            <a:extLst>
+              <a:ext uri="{FF2B5EF4-FFF2-40B4-BE49-F238E27FC236}">
+                <a16:creationId xmlns:a16="http://schemas.microsoft.com/office/drawing/2014/main" id="{DD60A9CE-EF62-E008-1944-2708EED942EC}"/>
+              </a:ext>
+            </a:extLst>
+          </p:cNvPr>
+          <p:cNvSpPr>
+            <a:spLocks noGrp="1"/>
+          </p:cNvSpPr>
+          <p:nvPr>
+            <p:ph type="body" sz="quarter" idx="12"/>
+          </p:nvPr>
+        </p:nvSpPr>
+        <p:spPr>
+          <a:xfrm>
+            <a:off x="216840" y="2085975"/>
+            <a:ext cx="11171595" cy="4414578"/>
+          </a:xfrm>
+        </p:spPr>
+        <p:txBody>
+          <a:bodyPr/>
+          <a:lstStyle/>
+          <a:p>
+            <a:r>
+              <a:rPr lang="lt-LT" sz="3000" dirty="0"/>
+              <a:t>Darbo tikslas: </a:t>
+            </a:r>
+            <a:r>
+              <a:rPr lang="lt-LT" sz="3000" b="0" dirty="0"/>
+              <a:t>sukurti sarso signalų įrašymas ir filtravimas sitemos maketą</a:t>
+            </a:r>
+          </a:p>
+          <a:p>
+            <a:endParaRPr lang="lt-LT" sz="3000" b="0" dirty="0"/>
+          </a:p>
+          <a:p>
+            <a:r>
+              <a:rPr lang="lt-LT" sz="3000" dirty="0"/>
+              <a:t>Darbo uždaviniai:</a:t>
+            </a:r>
+          </a:p>
+          <a:p>
+            <a:r>
+              <a:rPr lang="lt-LT" sz="3000" b="0" dirty="0"/>
+              <a:t>1.	Išanalizuoti rinkoje esančius sperndimus.</a:t>
+            </a:r>
+          </a:p>
+          <a:p>
+            <a:r>
+              <a:rPr lang="lt-LT" sz="3000" b="0" dirty="0"/>
+              <a:t>2.	Suprojektuoti bei sukurti garsus gebančią įrašyti sistemą.</a:t>
+            </a:r>
+          </a:p>
+          <a:p>
+            <a:r>
+              <a:rPr lang="lt-LT" sz="3000" b="0" dirty="0"/>
+              <a:t>3.	Atliklikti filtravimą.</a:t>
+            </a:r>
+          </a:p>
+          <a:p>
+            <a:endParaRPr lang="en-GB" sz="3000" dirty="0"/>
+          </a:p>
+        </p:txBody>
+      </p:sp>
+    </p:spTree>
+    <p:extLst>
+      <p:ext uri="{BB962C8B-B14F-4D97-AF65-F5344CB8AC3E}">
+        <p14:creationId xmlns:p14="http://schemas.microsoft.com/office/powerpoint/2010/main" val="755903612"/>
       </p:ext>
     </p:extLst>
   </p:cSld>
@@ -23598,7 +23879,7 @@
           <a:p>
             <a:r>
               <a:rPr lang="lt-LT" dirty="0"/>
-              <a:t>PSG aptikinas</a:t>
+              <a:t>Egiztuojantis sprendimai</a:t>
             </a:r>
           </a:p>
         </p:txBody>
@@ -23619,8 +23900,8 @@
         </p:nvSpPr>
         <p:spPr>
           <a:xfrm>
-            <a:off x="456339" y="1641764"/>
-            <a:ext cx="8978606" cy="1012659"/>
+            <a:off x="456338" y="1341727"/>
+            <a:ext cx="11073673" cy="1012659"/>
           </a:xfrm>
           <a:prstGeom prst="rect">
             <a:avLst/>
@@ -23796,62 +24077,99 @@
             </a:lvl9pPr>
           </a:lstStyle>
           <a:p>
-            <a:pPr marL="342900" indent="-342900">
-              <a:buFont typeface="Arial" panose="020B0604020202020204" pitchFamily="34" charset="0"/>
-              <a:buChar char="•"/>
-            </a:pPr>
-            <a:r>
-              <a:rPr lang="lt-LT" dirty="0"/>
-              <a:t>Kas yra ir kokie drawbacks</a:t>
+            <a:r>
+              <a:rPr lang="lt-LT" sz="3000" dirty="0"/>
+              <a:t>    Elektrodai/akselerometras                     Audio siganai</a:t>
             </a:r>
           </a:p>
         </p:txBody>
       </p:sp>
-      <p:sp>
-        <p:nvSpPr>
-          <p:cNvPr id="7" name="TextBox 6">
+      <p:pic>
+        <p:nvPicPr>
+          <p:cNvPr id="4" name="Picture 3">
             <a:extLst>
               <a:ext uri="{FF2B5EF4-FFF2-40B4-BE49-F238E27FC236}">
-                <a16:creationId xmlns:a16="http://schemas.microsoft.com/office/drawing/2014/main" id="{2D4BBA8F-A360-2C4F-2C1E-6E9FEB6C8E5E}"/>
+                <a16:creationId xmlns:a16="http://schemas.microsoft.com/office/drawing/2014/main" id="{F0664FD6-0AD7-3E93-0448-2AC6873DA6DF}"/>
               </a:ext>
             </a:extLst>
           </p:cNvPr>
-          <p:cNvSpPr txBox="1"/>
+          <p:cNvPicPr>
+            <a:picLocks noChangeAspect="1"/>
+          </p:cNvPicPr>
           <p:nvPr/>
-        </p:nvSpPr>
-        <p:spPr>
+        </p:nvPicPr>
+        <p:blipFill>
+          <a:blip r:embed="rId2">
+            <a:extLst>
+              <a:ext uri="{28A0092B-C50C-407E-A947-70E740481C1C}">
+                <a14:useLocalDpi xmlns:a14="http://schemas.microsoft.com/office/drawing/2010/main" val="0"/>
+              </a:ext>
+            </a:extLst>
+          </a:blip>
+          <a:srcRect/>
+          <a:stretch>
+            <a:fillRect/>
+          </a:stretch>
+        </p:blipFill>
+        <p:spPr bwMode="auto">
           <a:xfrm>
-            <a:off x="11477297" y="6299901"/>
-            <a:ext cx="304549" cy="430887"/>
+            <a:off x="0" y="3062746"/>
+            <a:ext cx="7658100" cy="3795254"/>
           </a:xfrm>
           <a:prstGeom prst="rect">
             <a:avLst/>
           </a:prstGeom>
           <a:noFill/>
+          <a:ln>
+            <a:noFill/>
+          </a:ln>
         </p:spPr>
-        <p:txBody>
-          <a:bodyPr wrap="square" rtlCol="0">
-            <a:spAutoFit/>
-          </a:bodyPr>
-          <a:lstStyle/>
-          <a:p>
-            <a:r>
-              <a:rPr lang="lt-LT" sz="2200" b="1" dirty="0">
-                <a:solidFill>
-                  <a:srgbClr val="FF0000"/>
-                </a:solidFill>
-                <a:latin typeface="Aharoni" panose="02010803020104030203" pitchFamily="2" charset="-79"/>
-                <a:cs typeface="Aharoni" panose="02010803020104030203" pitchFamily="2" charset="-79"/>
-              </a:rPr>
-              <a:t>8</a:t>
-            </a:r>
-          </a:p>
-        </p:txBody>
-      </p:sp>
+      </p:pic>
+      <p:pic>
+        <p:nvPicPr>
+          <p:cNvPr id="5" name="Picture 4">
+            <a:extLst>
+              <a:ext uri="{FF2B5EF4-FFF2-40B4-BE49-F238E27FC236}">
+                <a16:creationId xmlns:a16="http://schemas.microsoft.com/office/drawing/2014/main" id="{652D27F9-B143-C7E1-C994-BD025CB72D12}"/>
+              </a:ext>
+            </a:extLst>
+          </p:cNvPr>
+          <p:cNvPicPr>
+            <a:picLocks noChangeAspect="1"/>
+          </p:cNvPicPr>
+          <p:nvPr/>
+        </p:nvPicPr>
+        <p:blipFill>
+          <a:blip r:embed="rId3">
+            <a:extLst>
+              <a:ext uri="{28A0092B-C50C-407E-A947-70E740481C1C}">
+                <a14:useLocalDpi xmlns:a14="http://schemas.microsoft.com/office/drawing/2010/main" val="0"/>
+              </a:ext>
+            </a:extLst>
+          </a:blip>
+          <a:srcRect/>
+          <a:stretch>
+            <a:fillRect/>
+          </a:stretch>
+        </p:blipFill>
+        <p:spPr bwMode="auto">
+          <a:xfrm>
+            <a:off x="7817599" y="3113521"/>
+            <a:ext cx="3712413" cy="3744479"/>
+          </a:xfrm>
+          <a:prstGeom prst="rect">
+            <a:avLst/>
+          </a:prstGeom>
+          <a:noFill/>
+          <a:ln>
+            <a:noFill/>
+          </a:ln>
+        </p:spPr>
+      </p:pic>
     </p:spTree>
     <p:extLst>
       <p:ext uri="{BB962C8B-B14F-4D97-AF65-F5344CB8AC3E}">
-        <p14:creationId xmlns:p14="http://schemas.microsoft.com/office/powerpoint/2010/main" val="862628768"/>
+        <p14:creationId xmlns:p14="http://schemas.microsoft.com/office/powerpoint/2010/main" val="3040414361"/>
       </p:ext>
     </p:extLst>
   </p:cSld>
@@ -23883,7 +24201,7 @@
           <p:cNvPr id="2" name="Text Placeholder 1">
             <a:extLst>
               <a:ext uri="{FF2B5EF4-FFF2-40B4-BE49-F238E27FC236}">
-                <a16:creationId xmlns:a16="http://schemas.microsoft.com/office/drawing/2014/main" id="{41233870-7BC0-7362-1E76-46246CEADCD4}"/>
+                <a16:creationId xmlns:a16="http://schemas.microsoft.com/office/drawing/2014/main" id="{4BF41ED2-32ED-3FBD-3714-A5B7C2499D70}"/>
               </a:ext>
             </a:extLst>
           </p:cNvPr>
@@ -23901,76 +24219,256 @@
           <a:p>
             <a:r>
               <a:rPr lang="lt-LT" dirty="0"/>
-              <a:t>Darbo uždaviniai ir tikslas</a:t>
-            </a:r>
-            <a:endParaRPr lang="en-GB" b="1" dirty="0"/>
+              <a:t>Egiztuojantis sprendimai</a:t>
+            </a:r>
           </a:p>
         </p:txBody>
       </p:sp>
       <p:sp>
         <p:nvSpPr>
-          <p:cNvPr id="4" name="Text Placeholder 3">
+          <p:cNvPr id="3" name="Text Placeholder 3">
             <a:extLst>
               <a:ext uri="{FF2B5EF4-FFF2-40B4-BE49-F238E27FC236}">
-                <a16:creationId xmlns:a16="http://schemas.microsoft.com/office/drawing/2014/main" id="{DD60A9CE-EF62-E008-1944-2708EED942EC}"/>
+                <a16:creationId xmlns:a16="http://schemas.microsoft.com/office/drawing/2014/main" id="{121F8870-B73B-27B6-5FF2-A04C8774E1AA}"/>
               </a:ext>
             </a:extLst>
           </p:cNvPr>
-          <p:cNvSpPr>
-            <a:spLocks noGrp="1"/>
+          <p:cNvSpPr txBox="1">
+            <a:spLocks/>
           </p:cNvSpPr>
-          <p:nvPr>
-            <p:ph type="body" sz="quarter" idx="12"/>
-          </p:nvPr>
+          <p:nvPr/>
         </p:nvSpPr>
         <p:spPr>
           <a:xfrm>
-            <a:off x="216841" y="1627573"/>
-            <a:ext cx="7640226" cy="4629690"/>
+            <a:off x="456339" y="1341727"/>
+            <a:ext cx="8978606" cy="1012659"/>
           </a:xfrm>
+          <a:prstGeom prst="rect">
+            <a:avLst/>
+          </a:prstGeom>
         </p:spPr>
         <p:txBody>
-          <a:bodyPr/>
-          <a:lstStyle/>
+          <a:bodyPr anchor="b"/>
+          <a:lstStyle>
+            <a:lvl1pPr marL="0" indent="0" algn="l" defTabSz="914400" rtl="0" eaLnBrk="1" latinLnBrk="0" hangingPunct="1">
+              <a:lnSpc>
+                <a:spcPct val="110000"/>
+              </a:lnSpc>
+              <a:spcBef>
+                <a:spcPts val="0"/>
+              </a:spcBef>
+              <a:spcAft>
+                <a:spcPts val="0"/>
+              </a:spcAft>
+              <a:buFont typeface="+mj-lt"/>
+              <a:buNone/>
+              <a:defRPr sz="2200" b="1" i="0" kern="1200">
+                <a:solidFill>
+                  <a:schemeClr val="bg1"/>
+                </a:solidFill>
+                <a:latin typeface="Arial" panose="020B0604020202020204" pitchFamily="34" charset="0"/>
+                <a:ea typeface="Inter Medium" panose="020B0502030000000004" pitchFamily="34" charset="0"/>
+                <a:cs typeface="Arial" panose="020B0604020202020204" pitchFamily="34" charset="0"/>
+              </a:defRPr>
+            </a:lvl1pPr>
+            <a:lvl2pPr marL="685800" indent="-228600" algn="l" defTabSz="914400" rtl="0" eaLnBrk="1" latinLnBrk="0" hangingPunct="1">
+              <a:lnSpc>
+                <a:spcPct val="90000"/>
+              </a:lnSpc>
+              <a:spcBef>
+                <a:spcPts val="500"/>
+              </a:spcBef>
+              <a:buFont typeface="Arial" panose="020B0604020202020204" pitchFamily="34" charset="0"/>
+              <a:buChar char="•"/>
+              <a:defRPr sz="2400" kern="1200">
+                <a:solidFill>
+                  <a:schemeClr val="tx1"/>
+                </a:solidFill>
+                <a:latin typeface="+mn-lt"/>
+                <a:ea typeface="+mn-ea"/>
+                <a:cs typeface="+mn-cs"/>
+              </a:defRPr>
+            </a:lvl2pPr>
+            <a:lvl3pPr marL="1143000" indent="-228600" algn="l" defTabSz="914400" rtl="0" eaLnBrk="1" latinLnBrk="0" hangingPunct="1">
+              <a:lnSpc>
+                <a:spcPct val="90000"/>
+              </a:lnSpc>
+              <a:spcBef>
+                <a:spcPts val="500"/>
+              </a:spcBef>
+              <a:buFont typeface="Arial" panose="020B0604020202020204" pitchFamily="34" charset="0"/>
+              <a:buChar char="•"/>
+              <a:defRPr sz="2000" kern="1200">
+                <a:solidFill>
+                  <a:schemeClr val="tx1"/>
+                </a:solidFill>
+                <a:latin typeface="+mn-lt"/>
+                <a:ea typeface="+mn-ea"/>
+                <a:cs typeface="+mn-cs"/>
+              </a:defRPr>
+            </a:lvl3pPr>
+            <a:lvl4pPr marL="1600200" indent="-228600" algn="l" defTabSz="914400" rtl="0" eaLnBrk="1" latinLnBrk="0" hangingPunct="1">
+              <a:lnSpc>
+                <a:spcPct val="90000"/>
+              </a:lnSpc>
+              <a:spcBef>
+                <a:spcPts val="500"/>
+              </a:spcBef>
+              <a:buFont typeface="Arial" panose="020B0604020202020204" pitchFamily="34" charset="0"/>
+              <a:buChar char="•"/>
+              <a:defRPr sz="1800" kern="1200">
+                <a:solidFill>
+                  <a:schemeClr val="tx1"/>
+                </a:solidFill>
+                <a:latin typeface="+mn-lt"/>
+                <a:ea typeface="+mn-ea"/>
+                <a:cs typeface="+mn-cs"/>
+              </a:defRPr>
+            </a:lvl4pPr>
+            <a:lvl5pPr marL="2057400" indent="-228600" algn="l" defTabSz="914400" rtl="0" eaLnBrk="1" latinLnBrk="0" hangingPunct="1">
+              <a:lnSpc>
+                <a:spcPct val="90000"/>
+              </a:lnSpc>
+              <a:spcBef>
+                <a:spcPts val="500"/>
+              </a:spcBef>
+              <a:buFont typeface="Arial" panose="020B0604020202020204" pitchFamily="34" charset="0"/>
+              <a:buChar char="•"/>
+              <a:defRPr sz="1800" kern="1200">
+                <a:solidFill>
+                  <a:schemeClr val="tx1"/>
+                </a:solidFill>
+                <a:latin typeface="+mn-lt"/>
+                <a:ea typeface="+mn-ea"/>
+                <a:cs typeface="+mn-cs"/>
+              </a:defRPr>
+            </a:lvl5pPr>
+            <a:lvl6pPr marL="2514600" indent="-228600" algn="l" defTabSz="914400" rtl="0" eaLnBrk="1" latinLnBrk="0" hangingPunct="1">
+              <a:lnSpc>
+                <a:spcPct val="90000"/>
+              </a:lnSpc>
+              <a:spcBef>
+                <a:spcPts val="500"/>
+              </a:spcBef>
+              <a:buFont typeface="Arial" panose="020B0604020202020204" pitchFamily="34" charset="0"/>
+              <a:buChar char="•"/>
+              <a:defRPr sz="1800" kern="1200">
+                <a:solidFill>
+                  <a:schemeClr val="tx1"/>
+                </a:solidFill>
+                <a:latin typeface="+mn-lt"/>
+                <a:ea typeface="+mn-ea"/>
+                <a:cs typeface="+mn-cs"/>
+              </a:defRPr>
+            </a:lvl6pPr>
+            <a:lvl7pPr marL="2971800" indent="-228600" algn="l" defTabSz="914400" rtl="0" eaLnBrk="1" latinLnBrk="0" hangingPunct="1">
+              <a:lnSpc>
+                <a:spcPct val="90000"/>
+              </a:lnSpc>
+              <a:spcBef>
+                <a:spcPts val="500"/>
+              </a:spcBef>
+              <a:buFont typeface="Arial" panose="020B0604020202020204" pitchFamily="34" charset="0"/>
+              <a:buChar char="•"/>
+              <a:defRPr sz="1800" kern="1200">
+                <a:solidFill>
+                  <a:schemeClr val="tx1"/>
+                </a:solidFill>
+                <a:latin typeface="+mn-lt"/>
+                <a:ea typeface="+mn-ea"/>
+                <a:cs typeface="+mn-cs"/>
+              </a:defRPr>
+            </a:lvl7pPr>
+            <a:lvl8pPr marL="3429000" indent="-228600" algn="l" defTabSz="914400" rtl="0" eaLnBrk="1" latinLnBrk="0" hangingPunct="1">
+              <a:lnSpc>
+                <a:spcPct val="90000"/>
+              </a:lnSpc>
+              <a:spcBef>
+                <a:spcPts val="500"/>
+              </a:spcBef>
+              <a:buFont typeface="Arial" panose="020B0604020202020204" pitchFamily="34" charset="0"/>
+              <a:buChar char="•"/>
+              <a:defRPr sz="1800" kern="1200">
+                <a:solidFill>
+                  <a:schemeClr val="tx1"/>
+                </a:solidFill>
+                <a:latin typeface="+mn-lt"/>
+                <a:ea typeface="+mn-ea"/>
+                <a:cs typeface="+mn-cs"/>
+              </a:defRPr>
+            </a:lvl8pPr>
+            <a:lvl9pPr marL="3886200" indent="-228600" algn="l" defTabSz="914400" rtl="0" eaLnBrk="1" latinLnBrk="0" hangingPunct="1">
+              <a:lnSpc>
+                <a:spcPct val="90000"/>
+              </a:lnSpc>
+              <a:spcBef>
+                <a:spcPts val="500"/>
+              </a:spcBef>
+              <a:buFont typeface="Arial" panose="020B0604020202020204" pitchFamily="34" charset="0"/>
+              <a:buChar char="•"/>
+              <a:defRPr sz="1800" kern="1200">
+                <a:solidFill>
+                  <a:schemeClr val="tx1"/>
+                </a:solidFill>
+                <a:latin typeface="+mn-lt"/>
+                <a:ea typeface="+mn-ea"/>
+                <a:cs typeface="+mn-cs"/>
+              </a:defRPr>
+            </a:lvl9pPr>
+          </a:lstStyle>
           <a:p>
             <a:r>
               <a:rPr lang="lt-LT" dirty="0"/>
-              <a:t>Darbo tikslas: sukurti sarso signalų įrašymas ir filtravimas sitemos maketą</a:t>
-            </a:r>
-          </a:p>
-          <a:p>
-            <a:r>
-              <a:rPr lang="lt-LT" dirty="0"/>
-              <a:t>Darbo uždaviniai:</a:t>
-            </a:r>
-          </a:p>
-          <a:p>
-            <a:r>
-              <a:rPr lang="lt-LT" dirty="0"/>
-              <a:t>1.	Išanalizuoti rinkoje esančius sperndimus.</a:t>
-            </a:r>
-          </a:p>
-          <a:p>
-            <a:r>
-              <a:rPr lang="lt-LT" dirty="0"/>
-              <a:t>2.	Suprojektuoti bei sukurti garsus gebančią įrašyti sistemą.</a:t>
-            </a:r>
-          </a:p>
-          <a:p>
-            <a:r>
-              <a:rPr lang="lt-LT" dirty="0"/>
-              <a:t>3.	Atliklikti filtravimą.</a:t>
-            </a:r>
-          </a:p>
-          <a:p>
-            <a:endParaRPr lang="en-GB" dirty="0"/>
+              <a:t>    Akselerometro pagrindu (pastebimas SD kortelių naudojimas)</a:t>
+            </a:r>
           </a:p>
         </p:txBody>
       </p:sp>
+      <p:pic>
+        <p:nvPicPr>
+          <p:cNvPr id="6" name="Picture 5">
+            <a:extLst>
+              <a:ext uri="{FF2B5EF4-FFF2-40B4-BE49-F238E27FC236}">
+                <a16:creationId xmlns:a16="http://schemas.microsoft.com/office/drawing/2014/main" id="{33DD6E6B-A183-E71B-4230-F288B77EDAAC}"/>
+              </a:ext>
+            </a:extLst>
+          </p:cNvPr>
+          <p:cNvPicPr>
+            <a:picLocks noChangeAspect="1"/>
+          </p:cNvPicPr>
+          <p:nvPr/>
+        </p:nvPicPr>
+        <p:blipFill>
+          <a:blip r:embed="rId2">
+            <a:extLst>
+              <a:ext uri="{28A0092B-C50C-407E-A947-70E740481C1C}">
+                <a14:useLocalDpi xmlns:a14="http://schemas.microsoft.com/office/drawing/2010/main" val="0"/>
+              </a:ext>
+            </a:extLst>
+          </a:blip>
+          <a:srcRect/>
+          <a:stretch>
+            <a:fillRect/>
+          </a:stretch>
+        </p:blipFill>
+        <p:spPr bwMode="auto">
+          <a:xfrm>
+            <a:off x="9525" y="2585740"/>
+            <a:ext cx="11126188" cy="4272260"/>
+          </a:xfrm>
+          <a:prstGeom prst="rect">
+            <a:avLst/>
+          </a:prstGeom>
+          <a:noFill/>
+          <a:ln>
+            <a:noFill/>
+          </a:ln>
+        </p:spPr>
+      </p:pic>
     </p:spTree>
     <p:extLst>
       <p:ext uri="{BB962C8B-B14F-4D97-AF65-F5344CB8AC3E}">
-        <p14:creationId xmlns:p14="http://schemas.microsoft.com/office/powerpoint/2010/main" val="755903612"/>
+        <p14:creationId xmlns:p14="http://schemas.microsoft.com/office/powerpoint/2010/main" val="1161280930"/>
       </p:ext>
     </p:extLst>
   </p:cSld>
@@ -24020,7 +24518,7 @@
           <a:p>
             <a:r>
               <a:rPr lang="lt-LT" dirty="0"/>
-              <a:t>Egiztuojantis sprendimai</a:t>
+              <a:t>BlueCoin</a:t>
             </a:r>
           </a:p>
         </p:txBody>
@@ -24030,7 +24528,7 @@
           <p:cNvPr id="3" name="Text Placeholder 3">
             <a:extLst>
               <a:ext uri="{FF2B5EF4-FFF2-40B4-BE49-F238E27FC236}">
-                <a16:creationId xmlns:a16="http://schemas.microsoft.com/office/drawing/2014/main" id="{121F8870-B73B-27B6-5FF2-A04C8774E1AA}"/>
+                <a16:creationId xmlns:a16="http://schemas.microsoft.com/office/drawing/2014/main" id="{081CBFC1-8E86-EF10-217B-FE4F89D7F802}"/>
               </a:ext>
             </a:extLst>
           </p:cNvPr>
@@ -24041,8 +24539,8 @@
         </p:nvSpPr>
         <p:spPr>
           <a:xfrm>
-            <a:off x="456339" y="1641764"/>
-            <a:ext cx="8978606" cy="1012659"/>
+            <a:off x="405245" y="1609859"/>
+            <a:ext cx="11639117" cy="1919154"/>
           </a:xfrm>
           <a:prstGeom prst="rect">
             <a:avLst/>
@@ -24224,207 +24722,7 @@
             </a:pPr>
             <a:r>
               <a:rPr lang="lt-LT" dirty="0"/>
-              <a:t>Kas yra ir kokios pagrindinės veiklos sritys</a:t>
-            </a:r>
-          </a:p>
-        </p:txBody>
-      </p:sp>
-      <p:sp>
-        <p:nvSpPr>
-          <p:cNvPr id="6" name="Text Placeholder 3">
-            <a:extLst>
-              <a:ext uri="{FF2B5EF4-FFF2-40B4-BE49-F238E27FC236}">
-                <a16:creationId xmlns:a16="http://schemas.microsoft.com/office/drawing/2014/main" id="{A4ADE6AA-E2DA-99A0-DE14-EBD535625A50}"/>
-              </a:ext>
-            </a:extLst>
-          </p:cNvPr>
-          <p:cNvSpPr txBox="1">
-            <a:spLocks/>
-          </p:cNvSpPr>
-          <p:nvPr/>
-        </p:nvSpPr>
-        <p:spPr>
-          <a:xfrm>
-            <a:off x="456339" y="3335482"/>
-            <a:ext cx="4868002" cy="2730467"/>
-          </a:xfrm>
-          <a:prstGeom prst="rect">
-            <a:avLst/>
-          </a:prstGeom>
-        </p:spPr>
-        <p:txBody>
-          <a:bodyPr anchor="b"/>
-          <a:lstStyle>
-            <a:lvl1pPr marL="0" indent="0" algn="l" defTabSz="914400" rtl="0" eaLnBrk="1" latinLnBrk="0" hangingPunct="1">
-              <a:lnSpc>
-                <a:spcPct val="110000"/>
-              </a:lnSpc>
-              <a:spcBef>
-                <a:spcPts val="0"/>
-              </a:spcBef>
-              <a:spcAft>
-                <a:spcPts val="0"/>
-              </a:spcAft>
-              <a:buFont typeface="+mj-lt"/>
-              <a:buNone/>
-              <a:defRPr sz="2200" b="1" i="0" kern="1200">
-                <a:solidFill>
-                  <a:schemeClr val="bg1"/>
-                </a:solidFill>
-                <a:latin typeface="Arial" panose="020B0604020202020204" pitchFamily="34" charset="0"/>
-                <a:ea typeface="Inter Medium" panose="020B0502030000000004" pitchFamily="34" charset="0"/>
-                <a:cs typeface="Arial" panose="020B0604020202020204" pitchFamily="34" charset="0"/>
-              </a:defRPr>
-            </a:lvl1pPr>
-            <a:lvl2pPr marL="685800" indent="-228600" algn="l" defTabSz="914400" rtl="0" eaLnBrk="1" latinLnBrk="0" hangingPunct="1">
-              <a:lnSpc>
-                <a:spcPct val="90000"/>
-              </a:lnSpc>
-              <a:spcBef>
-                <a:spcPts val="500"/>
-              </a:spcBef>
-              <a:buFont typeface="Arial" panose="020B0604020202020204" pitchFamily="34" charset="0"/>
-              <a:buChar char="•"/>
-              <a:defRPr sz="2400" kern="1200">
-                <a:solidFill>
-                  <a:schemeClr val="tx1"/>
-                </a:solidFill>
-                <a:latin typeface="+mn-lt"/>
-                <a:ea typeface="+mn-ea"/>
-                <a:cs typeface="+mn-cs"/>
-              </a:defRPr>
-            </a:lvl2pPr>
-            <a:lvl3pPr marL="1143000" indent="-228600" algn="l" defTabSz="914400" rtl="0" eaLnBrk="1" latinLnBrk="0" hangingPunct="1">
-              <a:lnSpc>
-                <a:spcPct val="90000"/>
-              </a:lnSpc>
-              <a:spcBef>
-                <a:spcPts val="500"/>
-              </a:spcBef>
-              <a:buFont typeface="Arial" panose="020B0604020202020204" pitchFamily="34" charset="0"/>
-              <a:buChar char="•"/>
-              <a:defRPr sz="2000" kern="1200">
-                <a:solidFill>
-                  <a:schemeClr val="tx1"/>
-                </a:solidFill>
-                <a:latin typeface="+mn-lt"/>
-                <a:ea typeface="+mn-ea"/>
-                <a:cs typeface="+mn-cs"/>
-              </a:defRPr>
-            </a:lvl3pPr>
-            <a:lvl4pPr marL="1600200" indent="-228600" algn="l" defTabSz="914400" rtl="0" eaLnBrk="1" latinLnBrk="0" hangingPunct="1">
-              <a:lnSpc>
-                <a:spcPct val="90000"/>
-              </a:lnSpc>
-              <a:spcBef>
-                <a:spcPts val="500"/>
-              </a:spcBef>
-              <a:buFont typeface="Arial" panose="020B0604020202020204" pitchFamily="34" charset="0"/>
-              <a:buChar char="•"/>
-              <a:defRPr sz="1800" kern="1200">
-                <a:solidFill>
-                  <a:schemeClr val="tx1"/>
-                </a:solidFill>
-                <a:latin typeface="+mn-lt"/>
-                <a:ea typeface="+mn-ea"/>
-                <a:cs typeface="+mn-cs"/>
-              </a:defRPr>
-            </a:lvl4pPr>
-            <a:lvl5pPr marL="2057400" indent="-228600" algn="l" defTabSz="914400" rtl="0" eaLnBrk="1" latinLnBrk="0" hangingPunct="1">
-              <a:lnSpc>
-                <a:spcPct val="90000"/>
-              </a:lnSpc>
-              <a:spcBef>
-                <a:spcPts val="500"/>
-              </a:spcBef>
-              <a:buFont typeface="Arial" panose="020B0604020202020204" pitchFamily="34" charset="0"/>
-              <a:buChar char="•"/>
-              <a:defRPr sz="1800" kern="1200">
-                <a:solidFill>
-                  <a:schemeClr val="tx1"/>
-                </a:solidFill>
-                <a:latin typeface="+mn-lt"/>
-                <a:ea typeface="+mn-ea"/>
-                <a:cs typeface="+mn-cs"/>
-              </a:defRPr>
-            </a:lvl5pPr>
-            <a:lvl6pPr marL="2514600" indent="-228600" algn="l" defTabSz="914400" rtl="0" eaLnBrk="1" latinLnBrk="0" hangingPunct="1">
-              <a:lnSpc>
-                <a:spcPct val="90000"/>
-              </a:lnSpc>
-              <a:spcBef>
-                <a:spcPts val="500"/>
-              </a:spcBef>
-              <a:buFont typeface="Arial" panose="020B0604020202020204" pitchFamily="34" charset="0"/>
-              <a:buChar char="•"/>
-              <a:defRPr sz="1800" kern="1200">
-                <a:solidFill>
-                  <a:schemeClr val="tx1"/>
-                </a:solidFill>
-                <a:latin typeface="+mn-lt"/>
-                <a:ea typeface="+mn-ea"/>
-                <a:cs typeface="+mn-cs"/>
-              </a:defRPr>
-            </a:lvl6pPr>
-            <a:lvl7pPr marL="2971800" indent="-228600" algn="l" defTabSz="914400" rtl="0" eaLnBrk="1" latinLnBrk="0" hangingPunct="1">
-              <a:lnSpc>
-                <a:spcPct val="90000"/>
-              </a:lnSpc>
-              <a:spcBef>
-                <a:spcPts val="500"/>
-              </a:spcBef>
-              <a:buFont typeface="Arial" panose="020B0604020202020204" pitchFamily="34" charset="0"/>
-              <a:buChar char="•"/>
-              <a:defRPr sz="1800" kern="1200">
-                <a:solidFill>
-                  <a:schemeClr val="tx1"/>
-                </a:solidFill>
-                <a:latin typeface="+mn-lt"/>
-                <a:ea typeface="+mn-ea"/>
-                <a:cs typeface="+mn-cs"/>
-              </a:defRPr>
-            </a:lvl7pPr>
-            <a:lvl8pPr marL="3429000" indent="-228600" algn="l" defTabSz="914400" rtl="0" eaLnBrk="1" latinLnBrk="0" hangingPunct="1">
-              <a:lnSpc>
-                <a:spcPct val="90000"/>
-              </a:lnSpc>
-              <a:spcBef>
-                <a:spcPts val="500"/>
-              </a:spcBef>
-              <a:buFont typeface="Arial" panose="020B0604020202020204" pitchFamily="34" charset="0"/>
-              <a:buChar char="•"/>
-              <a:defRPr sz="1800" kern="1200">
-                <a:solidFill>
-                  <a:schemeClr val="tx1"/>
-                </a:solidFill>
-                <a:latin typeface="+mn-lt"/>
-                <a:ea typeface="+mn-ea"/>
-                <a:cs typeface="+mn-cs"/>
-              </a:defRPr>
-            </a:lvl8pPr>
-            <a:lvl9pPr marL="3886200" indent="-228600" algn="l" defTabSz="914400" rtl="0" eaLnBrk="1" latinLnBrk="0" hangingPunct="1">
-              <a:lnSpc>
-                <a:spcPct val="90000"/>
-              </a:lnSpc>
-              <a:spcBef>
-                <a:spcPts val="500"/>
-              </a:spcBef>
-              <a:buFont typeface="Arial" panose="020B0604020202020204" pitchFamily="34" charset="0"/>
-              <a:buChar char="•"/>
-              <a:defRPr sz="1800" kern="1200">
-                <a:solidFill>
-                  <a:schemeClr val="tx1"/>
-                </a:solidFill>
-                <a:latin typeface="+mn-lt"/>
-                <a:ea typeface="+mn-ea"/>
-                <a:cs typeface="+mn-cs"/>
-              </a:defRPr>
-            </a:lvl9pPr>
-          </a:lstStyle>
-          <a:p>
-            <a:r>
-              <a:rPr lang="lt-LT" b="0" dirty="0"/>
-              <a:t>Žymiausios misjos:</a:t>
+              <a:t>Mikrofonų matrica - reikalinga pozicija, nes nemiegam vieni dažniausiai</a:t>
             </a:r>
           </a:p>
           <a:p>
@@ -24433,12 +24731,8 @@
               <a:buChar char="•"/>
             </a:pPr>
             <a:r>
-              <a:rPr lang="lt-LT" b="0" dirty="0">
-                <a:solidFill>
-                  <a:srgbClr val="FF0000"/>
-                </a:solidFill>
-              </a:rPr>
-              <a:t>Vibracijų</a:t>
+              <a:rPr lang="lt-LT" dirty="0"/>
+              <a:t>Integruoda SD kortelė</a:t>
             </a:r>
           </a:p>
           <a:p>
@@ -24447,12 +24741,8 @@
               <a:buChar char="•"/>
             </a:pPr>
             <a:r>
-              <a:rPr lang="lt-LT" b="0" dirty="0">
-                <a:solidFill>
-                  <a:srgbClr val="FF0000"/>
-                </a:solidFill>
-              </a:rPr>
-              <a:t>Radiacijos</a:t>
+              <a:rPr lang="lt-LT" dirty="0"/>
+              <a:t>BLE</a:t>
             </a:r>
           </a:p>
           <a:p>
@@ -24461,12 +24751,8 @@
               <a:buChar char="•"/>
             </a:pPr>
             <a:r>
-              <a:rPr lang="lt-LT" b="0" dirty="0">
-                <a:solidFill>
-                  <a:srgbClr val="FF0000"/>
-                </a:solidFill>
-              </a:rPr>
-              <a:t>Šiluminio vakuumo</a:t>
+              <a:rPr lang="lt-LT" dirty="0"/>
+              <a:t>STM32F446  pagrindu</a:t>
             </a:r>
           </a:p>
           <a:p>
@@ -24474,80 +24760,85 @@
               <a:buFont typeface="Arial" panose="020B0604020202020204" pitchFamily="34" charset="0"/>
               <a:buChar char="•"/>
             </a:pPr>
-            <a:r>
-              <a:rPr lang="lt-LT" b="0" dirty="0">
-                <a:solidFill>
-                  <a:srgbClr val="FF0000"/>
-                </a:solidFill>
-              </a:rPr>
-              <a:t>Modeliavimas/simuliacijos (HIL)</a:t>
-            </a:r>
-          </a:p>
-          <a:p>
-            <a:pPr marL="342900" indent="-342900">
-              <a:buFont typeface="Arial" panose="020B0604020202020204" pitchFamily="34" charset="0"/>
-              <a:buChar char="•"/>
-            </a:pPr>
-            <a:r>
-              <a:rPr lang="lt-LT" sz="1600" b="0" i="1" dirty="0">
-                <a:solidFill>
-                  <a:srgbClr val="FF0000"/>
-                </a:solidFill>
-              </a:rPr>
-              <a:t>Standartiniai elektronikos (elektromagnetinio suderinamumo ir komunikacijos antenos testai</a:t>
-            </a:r>
-            <a:r>
-              <a:rPr lang="lt-LT" sz="1600" b="0" i="1" dirty="0"/>
-              <a:t>) </a:t>
-            </a:r>
+            <a:endParaRPr lang="lt-LT" dirty="0"/>
           </a:p>
         </p:txBody>
       </p:sp>
-      <p:sp>
-        <p:nvSpPr>
-          <p:cNvPr id="7" name="TextBox 6">
+      <p:pic>
+        <p:nvPicPr>
+          <p:cNvPr id="4" name="Picture 3" descr="BlueCoin Hearing &amp; Motion Sensing - STMicro | Mouser">
             <a:extLst>
               <a:ext uri="{FF2B5EF4-FFF2-40B4-BE49-F238E27FC236}">
-                <a16:creationId xmlns:a16="http://schemas.microsoft.com/office/drawing/2014/main" id="{2D4BBA8F-A360-2C4F-2C1E-6E9FEB6C8E5E}"/>
+                <a16:creationId xmlns:a16="http://schemas.microsoft.com/office/drawing/2014/main" id="{5CC1C922-5C27-FB8E-8BCA-1A644D523480}"/>
               </a:ext>
             </a:extLst>
           </p:cNvPr>
-          <p:cNvSpPr txBox="1"/>
+          <p:cNvPicPr>
+            <a:picLocks noChangeAspect="1"/>
+          </p:cNvPicPr>
           <p:nvPr/>
-        </p:nvSpPr>
-        <p:spPr>
+        </p:nvPicPr>
+        <p:blipFill>
+          <a:blip r:embed="rId2">
+            <a:extLst>
+              <a:ext uri="{28A0092B-C50C-407E-A947-70E740481C1C}">
+                <a14:useLocalDpi xmlns:a14="http://schemas.microsoft.com/office/drawing/2010/main" val="0"/>
+              </a:ext>
+            </a:extLst>
+          </a:blip>
+          <a:srcRect/>
+          <a:stretch>
+            <a:fillRect/>
+          </a:stretch>
+        </p:blipFill>
+        <p:spPr bwMode="auto">
           <a:xfrm>
-            <a:off x="11477297" y="6299901"/>
-            <a:ext cx="304549" cy="430887"/>
+            <a:off x="242573" y="3404523"/>
+            <a:ext cx="5853428" cy="2784599"/>
           </a:xfrm>
           <a:prstGeom prst="rect">
             <a:avLst/>
           </a:prstGeom>
           <a:noFill/>
+          <a:ln>
+            <a:noFill/>
+          </a:ln>
         </p:spPr>
-        <p:txBody>
-          <a:bodyPr wrap="square" rtlCol="0">
-            <a:spAutoFit/>
-          </a:bodyPr>
-          <a:lstStyle/>
-          <a:p>
-            <a:r>
-              <a:rPr lang="lt-LT" sz="2200" b="1" dirty="0">
-                <a:solidFill>
-                  <a:srgbClr val="FF0000"/>
-                </a:solidFill>
-                <a:latin typeface="Aharoni" panose="02010803020104030203" pitchFamily="2" charset="-79"/>
-                <a:cs typeface="Aharoni" panose="02010803020104030203" pitchFamily="2" charset="-79"/>
-              </a:rPr>
-              <a:t>8</a:t>
-            </a:r>
-          </a:p>
-        </p:txBody>
-      </p:sp>
+      </p:pic>
+      <p:pic>
+        <p:nvPicPr>
+          <p:cNvPr id="5" name="Picture 4">
+            <a:extLst>
+              <a:ext uri="{FF2B5EF4-FFF2-40B4-BE49-F238E27FC236}">
+                <a16:creationId xmlns:a16="http://schemas.microsoft.com/office/drawing/2014/main" id="{988FF6A2-AFEF-DD3A-9280-A178F3D6ADF7}"/>
+              </a:ext>
+            </a:extLst>
+          </p:cNvPr>
+          <p:cNvPicPr>
+            <a:picLocks noChangeAspect="1"/>
+          </p:cNvPicPr>
+          <p:nvPr/>
+        </p:nvPicPr>
+        <p:blipFill>
+          <a:blip r:embed="rId3"/>
+          <a:stretch>
+            <a:fillRect/>
+          </a:stretch>
+        </p:blipFill>
+        <p:spPr>
+          <a:xfrm>
+            <a:off x="6548754" y="3429000"/>
+            <a:ext cx="5495608" cy="2782586"/>
+          </a:xfrm>
+          <a:prstGeom prst="rect">
+            <a:avLst/>
+          </a:prstGeom>
+        </p:spPr>
+      </p:pic>
     </p:spTree>
     <p:extLst>
       <p:ext uri="{BB962C8B-B14F-4D97-AF65-F5344CB8AC3E}">
-        <p14:creationId xmlns:p14="http://schemas.microsoft.com/office/powerpoint/2010/main" val="3040414361"/>
+        <p14:creationId xmlns:p14="http://schemas.microsoft.com/office/powerpoint/2010/main" val="680516282"/>
       </p:ext>
     </p:extLst>
   </p:cSld>
@@ -24596,281 +24887,12 @@
           <a:lstStyle/>
           <a:p>
             <a:r>
-              <a:rPr lang="lt-LT" dirty="0"/>
-              <a:t>BlueCoin</a:t>
-            </a:r>
-          </a:p>
-        </p:txBody>
-      </p:sp>
-      <p:sp>
-        <p:nvSpPr>
-          <p:cNvPr id="3" name="Text Placeholder 3">
-            <a:extLst>
-              <a:ext uri="{FF2B5EF4-FFF2-40B4-BE49-F238E27FC236}">
-                <a16:creationId xmlns:a16="http://schemas.microsoft.com/office/drawing/2014/main" id="{081CBFC1-8E86-EF10-217B-FE4F89D7F802}"/>
-              </a:ext>
-            </a:extLst>
-          </p:cNvPr>
-          <p:cNvSpPr txBox="1">
-            <a:spLocks/>
-          </p:cNvSpPr>
-          <p:nvPr/>
-        </p:nvSpPr>
-        <p:spPr>
-          <a:xfrm>
-            <a:off x="405246" y="1609859"/>
-            <a:ext cx="6108288" cy="1603067"/>
-          </a:xfrm>
-          <a:prstGeom prst="rect">
-            <a:avLst/>
-          </a:prstGeom>
-        </p:spPr>
-        <p:txBody>
-          <a:bodyPr anchor="b"/>
-          <a:lstStyle>
-            <a:lvl1pPr marL="0" indent="0" algn="l" defTabSz="914400" rtl="0" eaLnBrk="1" latinLnBrk="0" hangingPunct="1">
-              <a:lnSpc>
-                <a:spcPct val="110000"/>
-              </a:lnSpc>
-              <a:spcBef>
-                <a:spcPts val="0"/>
-              </a:spcBef>
-              <a:spcAft>
-                <a:spcPts val="0"/>
-              </a:spcAft>
-              <a:buFont typeface="+mj-lt"/>
-              <a:buNone/>
-              <a:defRPr sz="2200" b="1" i="0" kern="1200">
-                <a:solidFill>
-                  <a:schemeClr val="bg1"/>
-                </a:solidFill>
-                <a:latin typeface="Arial" panose="020B0604020202020204" pitchFamily="34" charset="0"/>
-                <a:ea typeface="Inter Medium" panose="020B0502030000000004" pitchFamily="34" charset="0"/>
-                <a:cs typeface="Arial" panose="020B0604020202020204" pitchFamily="34" charset="0"/>
-              </a:defRPr>
-            </a:lvl1pPr>
-            <a:lvl2pPr marL="685800" indent="-228600" algn="l" defTabSz="914400" rtl="0" eaLnBrk="1" latinLnBrk="0" hangingPunct="1">
-              <a:lnSpc>
-                <a:spcPct val="90000"/>
-              </a:lnSpc>
-              <a:spcBef>
-                <a:spcPts val="500"/>
-              </a:spcBef>
-              <a:buFont typeface="Arial" panose="020B0604020202020204" pitchFamily="34" charset="0"/>
-              <a:buChar char="•"/>
-              <a:defRPr sz="2400" kern="1200">
-                <a:solidFill>
-                  <a:schemeClr val="tx1"/>
-                </a:solidFill>
-                <a:latin typeface="+mn-lt"/>
-                <a:ea typeface="+mn-ea"/>
-                <a:cs typeface="+mn-cs"/>
-              </a:defRPr>
-            </a:lvl2pPr>
-            <a:lvl3pPr marL="1143000" indent="-228600" algn="l" defTabSz="914400" rtl="0" eaLnBrk="1" latinLnBrk="0" hangingPunct="1">
-              <a:lnSpc>
-                <a:spcPct val="90000"/>
-              </a:lnSpc>
-              <a:spcBef>
-                <a:spcPts val="500"/>
-              </a:spcBef>
-              <a:buFont typeface="Arial" panose="020B0604020202020204" pitchFamily="34" charset="0"/>
-              <a:buChar char="•"/>
-              <a:defRPr sz="2000" kern="1200">
-                <a:solidFill>
-                  <a:schemeClr val="tx1"/>
-                </a:solidFill>
-                <a:latin typeface="+mn-lt"/>
-                <a:ea typeface="+mn-ea"/>
-                <a:cs typeface="+mn-cs"/>
-              </a:defRPr>
-            </a:lvl3pPr>
-            <a:lvl4pPr marL="1600200" indent="-228600" algn="l" defTabSz="914400" rtl="0" eaLnBrk="1" latinLnBrk="0" hangingPunct="1">
-              <a:lnSpc>
-                <a:spcPct val="90000"/>
-              </a:lnSpc>
-              <a:spcBef>
-                <a:spcPts val="500"/>
-              </a:spcBef>
-              <a:buFont typeface="Arial" panose="020B0604020202020204" pitchFamily="34" charset="0"/>
-              <a:buChar char="•"/>
-              <a:defRPr sz="1800" kern="1200">
-                <a:solidFill>
-                  <a:schemeClr val="tx1"/>
-                </a:solidFill>
-                <a:latin typeface="+mn-lt"/>
-                <a:ea typeface="+mn-ea"/>
-                <a:cs typeface="+mn-cs"/>
-              </a:defRPr>
-            </a:lvl4pPr>
-            <a:lvl5pPr marL="2057400" indent="-228600" algn="l" defTabSz="914400" rtl="0" eaLnBrk="1" latinLnBrk="0" hangingPunct="1">
-              <a:lnSpc>
-                <a:spcPct val="90000"/>
-              </a:lnSpc>
-              <a:spcBef>
-                <a:spcPts val="500"/>
-              </a:spcBef>
-              <a:buFont typeface="Arial" panose="020B0604020202020204" pitchFamily="34" charset="0"/>
-              <a:buChar char="•"/>
-              <a:defRPr sz="1800" kern="1200">
-                <a:solidFill>
-                  <a:schemeClr val="tx1"/>
-                </a:solidFill>
-                <a:latin typeface="+mn-lt"/>
-                <a:ea typeface="+mn-ea"/>
-                <a:cs typeface="+mn-cs"/>
-              </a:defRPr>
-            </a:lvl5pPr>
-            <a:lvl6pPr marL="2514600" indent="-228600" algn="l" defTabSz="914400" rtl="0" eaLnBrk="1" latinLnBrk="0" hangingPunct="1">
-              <a:lnSpc>
-                <a:spcPct val="90000"/>
-              </a:lnSpc>
-              <a:spcBef>
-                <a:spcPts val="500"/>
-              </a:spcBef>
-              <a:buFont typeface="Arial" panose="020B0604020202020204" pitchFamily="34" charset="0"/>
-              <a:buChar char="•"/>
-              <a:defRPr sz="1800" kern="1200">
-                <a:solidFill>
-                  <a:schemeClr val="tx1"/>
-                </a:solidFill>
-                <a:latin typeface="+mn-lt"/>
-                <a:ea typeface="+mn-ea"/>
-                <a:cs typeface="+mn-cs"/>
-              </a:defRPr>
-            </a:lvl6pPr>
-            <a:lvl7pPr marL="2971800" indent="-228600" algn="l" defTabSz="914400" rtl="0" eaLnBrk="1" latinLnBrk="0" hangingPunct="1">
-              <a:lnSpc>
-                <a:spcPct val="90000"/>
-              </a:lnSpc>
-              <a:spcBef>
-                <a:spcPts val="500"/>
-              </a:spcBef>
-              <a:buFont typeface="Arial" panose="020B0604020202020204" pitchFamily="34" charset="0"/>
-              <a:buChar char="•"/>
-              <a:defRPr sz="1800" kern="1200">
-                <a:solidFill>
-                  <a:schemeClr val="tx1"/>
-                </a:solidFill>
-                <a:latin typeface="+mn-lt"/>
-                <a:ea typeface="+mn-ea"/>
-                <a:cs typeface="+mn-cs"/>
-              </a:defRPr>
-            </a:lvl7pPr>
-            <a:lvl8pPr marL="3429000" indent="-228600" algn="l" defTabSz="914400" rtl="0" eaLnBrk="1" latinLnBrk="0" hangingPunct="1">
-              <a:lnSpc>
-                <a:spcPct val="90000"/>
-              </a:lnSpc>
-              <a:spcBef>
-                <a:spcPts val="500"/>
-              </a:spcBef>
-              <a:buFont typeface="Arial" panose="020B0604020202020204" pitchFamily="34" charset="0"/>
-              <a:buChar char="•"/>
-              <a:defRPr sz="1800" kern="1200">
-                <a:solidFill>
-                  <a:schemeClr val="tx1"/>
-                </a:solidFill>
-                <a:latin typeface="+mn-lt"/>
-                <a:ea typeface="+mn-ea"/>
-                <a:cs typeface="+mn-cs"/>
-              </a:defRPr>
-            </a:lvl8pPr>
-            <a:lvl9pPr marL="3886200" indent="-228600" algn="l" defTabSz="914400" rtl="0" eaLnBrk="1" latinLnBrk="0" hangingPunct="1">
-              <a:lnSpc>
-                <a:spcPct val="90000"/>
-              </a:lnSpc>
-              <a:spcBef>
-                <a:spcPts val="500"/>
-              </a:spcBef>
-              <a:buFont typeface="Arial" panose="020B0604020202020204" pitchFamily="34" charset="0"/>
-              <a:buChar char="•"/>
-              <a:defRPr sz="1800" kern="1200">
-                <a:solidFill>
-                  <a:schemeClr val="tx1"/>
-                </a:solidFill>
-                <a:latin typeface="+mn-lt"/>
-                <a:ea typeface="+mn-ea"/>
-                <a:cs typeface="+mn-cs"/>
-              </a:defRPr>
-            </a:lvl9pPr>
-          </a:lstStyle>
-          <a:p>
-            <a:pPr marL="342900" indent="-342900">
-              <a:buFont typeface="Arial" panose="020B0604020202020204" pitchFamily="34" charset="0"/>
-              <a:buChar char="•"/>
-            </a:pPr>
-            <a:r>
-              <a:rPr lang="lt-LT" dirty="0"/>
-              <a:t>Reikalinga pozicija, nes nemiegam vieni dažniausiai</a:t>
-            </a:r>
-          </a:p>
-          <a:p>
-            <a:pPr marL="342900" indent="-342900">
-              <a:buFont typeface="Arial" panose="020B0604020202020204" pitchFamily="34" charset="0"/>
-              <a:buChar char="•"/>
-            </a:pPr>
-            <a:endParaRPr lang="lt-LT" dirty="0"/>
-          </a:p>
-        </p:txBody>
-      </p:sp>
-    </p:spTree>
-    <p:extLst>
-      <p:ext uri="{BB962C8B-B14F-4D97-AF65-F5344CB8AC3E}">
-        <p14:creationId xmlns:p14="http://schemas.microsoft.com/office/powerpoint/2010/main" val="680516282"/>
-      </p:ext>
-    </p:extLst>
-  </p:cSld>
-  <p:clrMapOvr>
-    <a:masterClrMapping/>
-  </p:clrMapOvr>
-</p:sld>
-</file>
-
-<file path=ppt/slides/slide8.xml><?xml version="1.0" encoding="utf-8"?>
-<p:sld xmlns:a="http://schemas.openxmlformats.org/drawingml/2006/main" xmlns:r="http://schemas.openxmlformats.org/officeDocument/2006/relationships" xmlns:p="http://schemas.openxmlformats.org/presentationml/2006/main">
-  <p:cSld>
-    <p:spTree>
-      <p:nvGrpSpPr>
-        <p:cNvPr id="1" name=""/>
-        <p:cNvGrpSpPr/>
-        <p:nvPr/>
-      </p:nvGrpSpPr>
-      <p:grpSpPr>
-        <a:xfrm>
-          <a:off x="0" y="0"/>
-          <a:ext cx="0" cy="0"/>
-          <a:chOff x="0" y="0"/>
-          <a:chExt cx="0" cy="0"/>
-        </a:xfrm>
-      </p:grpSpPr>
-      <p:sp>
-        <p:nvSpPr>
-          <p:cNvPr id="2" name="Text Placeholder 1">
-            <a:extLst>
-              <a:ext uri="{FF2B5EF4-FFF2-40B4-BE49-F238E27FC236}">
-                <a16:creationId xmlns:a16="http://schemas.microsoft.com/office/drawing/2014/main" id="{4BF41ED2-32ED-3FBD-3714-A5B7C2499D70}"/>
-              </a:ext>
-            </a:extLst>
-          </p:cNvPr>
-          <p:cNvSpPr>
-            <a:spLocks noGrp="1"/>
-          </p:cNvSpPr>
-          <p:nvPr>
-            <p:ph type="body" sz="quarter" idx="11"/>
-          </p:nvPr>
-        </p:nvSpPr>
-        <p:spPr/>
-        <p:txBody>
-          <a:bodyPr/>
-          <a:lstStyle/>
-          <a:p>
-            <a:r>
               <a:rPr lang="lt-LT" dirty="0">
                 <a:solidFill>
                   <a:srgbClr val="FF0000"/>
                 </a:solidFill>
               </a:rPr>
-              <a:t>Išvados</a:t>
+              <a:t>Video</a:t>
             </a:r>
           </a:p>
         </p:txBody>
@@ -25074,37 +25096,7 @@
             </a:pPr>
             <a:r>
               <a:rPr lang="lt-LT" b="0" dirty="0"/>
-              <a:t>1. Darbe buv apžvelgti miego apnėjos problematika ir egiztuojantis sprendimo metodai.</a:t>
-            </a:r>
-          </a:p>
-          <a:p>
-            <a:pPr marL="342900" indent="-342900" algn="just">
-              <a:buFont typeface="Arial" panose="020B0604020202020204" pitchFamily="34" charset="0"/>
-              <a:buChar char="•"/>
-            </a:pPr>
-            <a:r>
-              <a:rPr lang="lt-LT" b="0" dirty="0"/>
-              <a:t>2.	Sukurta, sistema galinti </a:t>
-            </a:r>
-          </a:p>
-          <a:p>
-            <a:pPr marL="342900" indent="-342900" algn="just">
-              <a:buFont typeface="Arial" panose="020B0604020202020204" pitchFamily="34" charset="0"/>
-              <a:buChar char="•"/>
-            </a:pPr>
-            <a:r>
-              <a:rPr lang="lt-LT" b="0" dirty="0"/>
-              <a:t>3.	Duomenų įrašymas</a:t>
-            </a:r>
-          </a:p>
-          <a:p>
-            <a:pPr marL="342900" indent="-342900" algn="just">
-              <a:buFont typeface="Arial" panose="020B0604020202020204" pitchFamily="34" charset="0"/>
-              <a:buChar char="•"/>
-            </a:pPr>
-            <a:r>
-              <a:rPr lang="lt-LT" b="0" dirty="0"/>
-              <a:t>4.	Signalų filtravimas</a:t>
+              <a:t>GALIMAI</a:t>
             </a:r>
           </a:p>
         </p:txBody>
@@ -25113,6 +25105,129 @@
     <p:extLst>
       <p:ext uri="{BB962C8B-B14F-4D97-AF65-F5344CB8AC3E}">
         <p14:creationId xmlns:p14="http://schemas.microsoft.com/office/powerpoint/2010/main" val="1400602870"/>
+      </p:ext>
+    </p:extLst>
+  </p:cSld>
+  <p:clrMapOvr>
+    <a:masterClrMapping/>
+  </p:clrMapOvr>
+</p:sld>
+</file>
+
+<file path=ppt/slides/slide8.xml><?xml version="1.0" encoding="utf-8"?>
+<p:sld xmlns:a="http://schemas.openxmlformats.org/drawingml/2006/main" xmlns:r="http://schemas.openxmlformats.org/officeDocument/2006/relationships" xmlns:p="http://schemas.openxmlformats.org/presentationml/2006/main">
+  <p:cSld>
+    <p:spTree>
+      <p:nvGrpSpPr>
+        <p:cNvPr id="1" name=""/>
+        <p:cNvGrpSpPr/>
+        <p:nvPr/>
+      </p:nvGrpSpPr>
+      <p:grpSpPr>
+        <a:xfrm>
+          <a:off x="0" y="0"/>
+          <a:ext cx="0" cy="0"/>
+          <a:chOff x="0" y="0"/>
+          <a:chExt cx="0" cy="0"/>
+        </a:xfrm>
+      </p:grpSpPr>
+      <p:sp>
+        <p:nvSpPr>
+          <p:cNvPr id="2" name="Text Placeholder 1">
+            <a:extLst>
+              <a:ext uri="{FF2B5EF4-FFF2-40B4-BE49-F238E27FC236}">
+                <a16:creationId xmlns:a16="http://schemas.microsoft.com/office/drawing/2014/main" id="{41233870-7BC0-7362-1E76-46246CEADCD4}"/>
+              </a:ext>
+            </a:extLst>
+          </p:cNvPr>
+          <p:cNvSpPr>
+            <a:spLocks noGrp="1"/>
+          </p:cNvSpPr>
+          <p:nvPr>
+            <p:ph type="body" sz="quarter" idx="11"/>
+          </p:nvPr>
+        </p:nvSpPr>
+        <p:spPr/>
+        <p:txBody>
+          <a:bodyPr/>
+          <a:lstStyle/>
+          <a:p>
+            <a:r>
+              <a:rPr lang="lt-LT" dirty="0"/>
+              <a:t>Tolimesni darbai</a:t>
+            </a:r>
+            <a:endParaRPr lang="en-GB" b="1" dirty="0"/>
+          </a:p>
+        </p:txBody>
+      </p:sp>
+      <p:sp>
+        <p:nvSpPr>
+          <p:cNvPr id="4" name="Text Placeholder 3">
+            <a:extLst>
+              <a:ext uri="{FF2B5EF4-FFF2-40B4-BE49-F238E27FC236}">
+                <a16:creationId xmlns:a16="http://schemas.microsoft.com/office/drawing/2014/main" id="{DD60A9CE-EF62-E008-1944-2708EED942EC}"/>
+              </a:ext>
+            </a:extLst>
+          </p:cNvPr>
+          <p:cNvSpPr>
+            <a:spLocks noGrp="1"/>
+          </p:cNvSpPr>
+          <p:nvPr>
+            <p:ph type="body" sz="quarter" idx="12"/>
+          </p:nvPr>
+        </p:nvSpPr>
+        <p:spPr>
+          <a:xfrm>
+            <a:off x="216841" y="2085975"/>
+            <a:ext cx="9884422" cy="3328325"/>
+          </a:xfrm>
+        </p:spPr>
+        <p:txBody>
+          <a:bodyPr/>
+          <a:lstStyle/>
+          <a:p>
+            <a:pPr marL="342900" indent="-342900">
+              <a:buFont typeface="Arial" panose="020B0604020202020204" pitchFamily="34" charset="0"/>
+              <a:buChar char="•"/>
+            </a:pPr>
+            <a:r>
+              <a:rPr lang="lt-LT" sz="3000" dirty="0"/>
+              <a:t>Failų sistemos integravimas</a:t>
+            </a:r>
+          </a:p>
+          <a:p>
+            <a:pPr marL="342900" indent="-342900">
+              <a:buFont typeface="Arial" panose="020B0604020202020204" pitchFamily="34" charset="0"/>
+              <a:buChar char="•"/>
+            </a:pPr>
+            <a:r>
+              <a:rPr lang="lt-LT" sz="3000" dirty="0"/>
+              <a:t>Vartotojo sąsaja ar paprastas API</a:t>
+            </a:r>
+          </a:p>
+          <a:p>
+            <a:pPr marL="342900" indent="-342900">
+              <a:buFont typeface="Arial" panose="020B0604020202020204" pitchFamily="34" charset="0"/>
+              <a:buChar char="•"/>
+            </a:pPr>
+            <a:r>
+              <a:rPr lang="lt-LT" sz="3000" dirty="0"/>
+              <a:t>Audio signalų filtravimas ir įrašymas</a:t>
+            </a:r>
+          </a:p>
+          <a:p>
+            <a:pPr marL="342900" indent="-342900">
+              <a:buFont typeface="Arial" panose="020B0604020202020204" pitchFamily="34" charset="0"/>
+              <a:buChar char="•"/>
+            </a:pPr>
+            <a:endParaRPr lang="en-GB" sz="3000" dirty="0"/>
+          </a:p>
+        </p:txBody>
+      </p:sp>
+    </p:spTree>
+    <p:extLst>
+      <p:ext uri="{BB962C8B-B14F-4D97-AF65-F5344CB8AC3E}">
+        <p14:creationId xmlns:p14="http://schemas.microsoft.com/office/powerpoint/2010/main" val="3101827492"/>
       </p:ext>
     </p:extLst>
   </p:cSld>

</xml_diff>